<commit_message>
Add overview and requirements
</commit_message>
<xml_diff>
--- a/presentation/tech-writing/tech-writing-azure-static-web-apps.pptx
+++ b/presentation/tech-writing/tech-writing-azure-static-web-apps.pptx
@@ -5,18 +5,21 @@
     <p:sldMasterId id="2147483672" r:id="rId1"/>
   </p:sldMasterIdLst>
   <p:notesMasterIdLst>
-    <p:notesMasterId r:id="rId8"/>
+    <p:notesMasterId r:id="rId11"/>
   </p:notesMasterIdLst>
   <p:handoutMasterIdLst>
-    <p:handoutMasterId r:id="rId9"/>
+    <p:handoutMasterId r:id="rId12"/>
   </p:handoutMasterIdLst>
   <p:sldIdLst>
     <p:sldId id="256" r:id="rId2"/>
     <p:sldId id="281" r:id="rId3"/>
     <p:sldId id="287" r:id="rId4"/>
-    <p:sldId id="296" r:id="rId5"/>
-    <p:sldId id="280" r:id="rId6"/>
-    <p:sldId id="272" r:id="rId7"/>
+    <p:sldId id="297" r:id="rId5"/>
+    <p:sldId id="298" r:id="rId6"/>
+    <p:sldId id="299" r:id="rId7"/>
+    <p:sldId id="296" r:id="rId8"/>
+    <p:sldId id="280" r:id="rId9"/>
+    <p:sldId id="272" r:id="rId10"/>
   </p:sldIdLst>
   <p:sldSz cx="12192000" cy="6858000"/>
   <p:notesSz cx="6858000" cy="9144000"/>
@@ -2115,7 +2118,7 @@
     <p:bg>
       <p:bgPr>
         <a:solidFill>
-          <a:schemeClr val="lt1"/>
+          <a:srgbClr val="FFFFFF"/>
         </a:solidFill>
         <a:effectLst/>
       </p:bgPr>
@@ -3788,7 +3791,7 @@
                 </a:solidFill>
                 <a:latin typeface="+mj-lt"/>
               </a:rPr>
-              <a:t>Google tech writing course</a:t>
+              <a:t>Tech writing course by Google</a:t>
             </a:r>
           </a:p>
           <a:p>
@@ -3904,75 +3907,186 @@
           <a:chExt cx="0" cy="0"/>
         </a:xfrm>
       </p:grpSpPr>
-      <p:sp>
-        <p:nvSpPr>
-          <p:cNvPr id="2" name="Title 1">
+      <p:pic>
+        <p:nvPicPr>
+          <p:cNvPr id="5" name="Picture 2">
             <a:extLst>
               <a:ext uri="{FF2B5EF4-FFF2-40B4-BE49-F238E27FC236}">
-                <a16:creationId xmlns:a16="http://schemas.microsoft.com/office/drawing/2014/main" id="{D398BFED-2F7F-49BD-B480-56FC297B15A8}"/>
-              </a:ext>
-            </a:extLst>
-          </p:cNvPr>
-          <p:cNvSpPr>
-            <a:spLocks noGrp="1"/>
-          </p:cNvSpPr>
-          <p:nvPr>
-            <p:ph type="title"/>
-          </p:nvPr>
-        </p:nvSpPr>
-        <p:spPr>
-          <a:xfrm>
-            <a:off x="609600" y="0"/>
-            <a:ext cx="10972800" cy="1143000"/>
-          </a:xfrm>
-        </p:spPr>
-        <p:txBody>
-          <a:bodyPr anchor="ctr"/>
-          <a:lstStyle/>
-          <a:p>
-            <a:pPr algn="ctr"/>
-            <a:r>
-              <a:rPr lang="en-US" dirty="0">
-                <a:solidFill>
-                  <a:schemeClr val="tx1"/>
-                </a:solidFill>
-                <a:latin typeface="+mj-lt"/>
-              </a:rPr>
-              <a:t>Technical writing</a:t>
-            </a:r>
-          </a:p>
-        </p:txBody>
-      </p:sp>
-      <p:pic>
-        <p:nvPicPr>
-          <p:cNvPr id="4" name="Picture 3">
-            <a:extLst>
-              <a:ext uri="{FF2B5EF4-FFF2-40B4-BE49-F238E27FC236}">
-                <a16:creationId xmlns:a16="http://schemas.microsoft.com/office/drawing/2014/main" id="{EAD9C481-E811-41AA-A936-6EECA420880B}"/>
+                <a16:creationId xmlns:a16="http://schemas.microsoft.com/office/drawing/2014/main" id="{034F12E2-5B0F-40D7-8F8B-7258322C3D45}"/>
               </a:ext>
             </a:extLst>
           </p:cNvPr>
           <p:cNvPicPr>
-            <a:picLocks noChangeAspect="1"/>
+            <a:picLocks noChangeAspect="1" noChangeArrowheads="1"/>
           </p:cNvPicPr>
           <p:nvPr/>
         </p:nvPicPr>
         <p:blipFill>
-          <a:blip r:embed="rId2"/>
+          <a:blip r:embed="rId2">
+            <a:extLst>
+              <a:ext uri="{28A0092B-C50C-407E-A947-70E740481C1C}">
+                <a14:useLocalDpi xmlns:a14="http://schemas.microsoft.com/office/drawing/2010/main" val="0"/>
+              </a:ext>
+            </a:extLst>
+          </a:blip>
+          <a:srcRect/>
           <a:stretch>
             <a:fillRect/>
           </a:stretch>
         </p:blipFill>
-        <p:spPr>
+        <p:spPr bwMode="auto">
           <a:xfrm>
-            <a:off x="0" y="6270273"/>
-            <a:ext cx="1129537" cy="587727"/>
+            <a:off x="1129537" y="1273320"/>
+            <a:ext cx="4572000" cy="4581525"/>
           </a:xfrm>
           <a:prstGeom prst="rect">
             <a:avLst/>
           </a:prstGeom>
+          <a:noFill/>
+          <a:extLst>
+            <a:ext uri="{909E8E84-426E-40DD-AFC4-6F175D3DCCD1}">
+              <a14:hiddenFill xmlns:a14="http://schemas.microsoft.com/office/drawing/2010/main">
+                <a:solidFill>
+                  <a:srgbClr val="FFFFFF"/>
+                </a:solidFill>
+              </a14:hiddenFill>
+            </a:ext>
+          </a:extLst>
         </p:spPr>
       </p:pic>
+      <p:sp>
+        <p:nvSpPr>
+          <p:cNvPr id="11" name="TextBox 10">
+            <a:extLst>
+              <a:ext uri="{FF2B5EF4-FFF2-40B4-BE49-F238E27FC236}">
+                <a16:creationId xmlns:a16="http://schemas.microsoft.com/office/drawing/2014/main" id="{6DE1B819-801D-4139-91A2-AB5D0A22A5C2}"/>
+              </a:ext>
+            </a:extLst>
+          </p:cNvPr>
+          <p:cNvSpPr txBox="1"/>
+          <p:nvPr/>
+        </p:nvSpPr>
+        <p:spPr>
+          <a:xfrm>
+            <a:off x="9391233" y="6611779"/>
+            <a:ext cx="2800767" cy="246221"/>
+          </a:xfrm>
+          <a:prstGeom prst="rect">
+            <a:avLst/>
+          </a:prstGeom>
+          <a:noFill/>
+        </p:spPr>
+        <p:txBody>
+          <a:bodyPr wrap="none" rtlCol="0">
+            <a:spAutoFit/>
+          </a:bodyPr>
+          <a:lstStyle/>
+          <a:p>
+            <a:r>
+              <a:rPr lang="en-US" sz="1000" dirty="0">
+                <a:latin typeface="+mn-lt"/>
+                <a:hlinkClick r:id="rId3"/>
+              </a:rPr>
+              <a:t>developers.google.com/tech-writing</a:t>
+            </a:r>
+            <a:endParaRPr lang="en-US" sz="1000" dirty="0">
+              <a:latin typeface="+mn-lt"/>
+            </a:endParaRPr>
+          </a:p>
+        </p:txBody>
+      </p:sp>
+      <p:sp>
+        <p:nvSpPr>
+          <p:cNvPr id="10" name="TextBox 9">
+            <a:extLst>
+              <a:ext uri="{FF2B5EF4-FFF2-40B4-BE49-F238E27FC236}">
+                <a16:creationId xmlns:a16="http://schemas.microsoft.com/office/drawing/2014/main" id="{5B1ADD6B-BEFE-4B93-883F-81037C852E1B}"/>
+              </a:ext>
+            </a:extLst>
+          </p:cNvPr>
+          <p:cNvSpPr txBox="1"/>
+          <p:nvPr/>
+        </p:nvSpPr>
+        <p:spPr>
+          <a:xfrm>
+            <a:off x="5701538" y="2105561"/>
+            <a:ext cx="4678980" cy="2246769"/>
+          </a:xfrm>
+          <a:prstGeom prst="rect">
+            <a:avLst/>
+          </a:prstGeom>
+          <a:noFill/>
+        </p:spPr>
+        <p:txBody>
+          <a:bodyPr wrap="square" rtlCol="0">
+            <a:spAutoFit/>
+          </a:bodyPr>
+          <a:lstStyle/>
+          <a:p>
+            <a:pPr marL="285750" indent="-285750">
+              <a:buFont typeface="Arial" panose="020B0604020202020204" pitchFamily="34" charset="0"/>
+              <a:buChar char="•"/>
+            </a:pPr>
+            <a:r>
+              <a:rPr lang="en-US" sz="2000" dirty="0">
+                <a:latin typeface="+mn-lt"/>
+              </a:rPr>
+              <a:t>Technical writing courses by Google</a:t>
+            </a:r>
+          </a:p>
+          <a:p>
+            <a:pPr marL="285750" indent="-285750">
+              <a:buFont typeface="Arial" panose="020B0604020202020204" pitchFamily="34" charset="0"/>
+              <a:buChar char="•"/>
+            </a:pPr>
+            <a:endParaRPr lang="en-US" sz="2000" dirty="0">
+              <a:latin typeface="+mn-lt"/>
+            </a:endParaRPr>
+          </a:p>
+          <a:p>
+            <a:pPr marL="285750" indent="-285750">
+              <a:buFont typeface="Arial" panose="020B0604020202020204" pitchFamily="34" charset="0"/>
+              <a:buChar char="•"/>
+            </a:pPr>
+            <a:r>
+              <a:rPr lang="en-US" sz="2000" dirty="0">
+                <a:latin typeface="+mn-lt"/>
+              </a:rPr>
+              <a:t>Two parts 3 hours total</a:t>
+            </a:r>
+          </a:p>
+          <a:p>
+            <a:pPr marL="285750" indent="-285750">
+              <a:buFont typeface="Arial" panose="020B0604020202020204" pitchFamily="34" charset="0"/>
+              <a:buChar char="•"/>
+            </a:pPr>
+            <a:endParaRPr lang="en-US" sz="2000" dirty="0">
+              <a:latin typeface="+mn-lt"/>
+            </a:endParaRPr>
+          </a:p>
+          <a:p>
+            <a:pPr marL="285750" indent="-285750">
+              <a:buFont typeface="Arial" panose="020B0604020202020204" pitchFamily="34" charset="0"/>
+              <a:buChar char="•"/>
+            </a:pPr>
+            <a:r>
+              <a:rPr lang="en-US" sz="2000" dirty="0">
+                <a:latin typeface="+mn-lt"/>
+              </a:rPr>
+              <a:t>Pre-class and in-class</a:t>
+            </a:r>
+          </a:p>
+          <a:p>
+            <a:pPr marL="285750" indent="-285750">
+              <a:buFont typeface="Arial" panose="020B0604020202020204" pitchFamily="34" charset="0"/>
+              <a:buChar char="•"/>
+            </a:pPr>
+            <a:endParaRPr lang="en-US" sz="2000" dirty="0">
+              <a:latin typeface="+mn-lt"/>
+            </a:endParaRPr>
+          </a:p>
+        </p:txBody>
+      </p:sp>
     </p:spTree>
     <p:extLst>
       <p:ext uri="{BB962C8B-B14F-4D97-AF65-F5344CB8AC3E}">
@@ -4021,6 +4135,493 @@
         </p:nvSpPr>
         <p:spPr>
           <a:xfrm>
+            <a:off x="609600" y="0"/>
+            <a:ext cx="10972800" cy="1143000"/>
+          </a:xfrm>
+        </p:spPr>
+        <p:txBody>
+          <a:bodyPr anchor="ctr"/>
+          <a:lstStyle/>
+          <a:p>
+            <a:pPr algn="ctr"/>
+            <a:r>
+              <a:rPr lang="en-US" dirty="0">
+                <a:solidFill>
+                  <a:schemeClr val="tx1"/>
+                </a:solidFill>
+                <a:latin typeface="+mj-lt"/>
+              </a:rPr>
+              <a:t>Requirements</a:t>
+            </a:r>
+          </a:p>
+        </p:txBody>
+      </p:sp>
+      <p:sp>
+        <p:nvSpPr>
+          <p:cNvPr id="3" name="TextBox 2">
+            <a:extLst>
+              <a:ext uri="{FF2B5EF4-FFF2-40B4-BE49-F238E27FC236}">
+                <a16:creationId xmlns:a16="http://schemas.microsoft.com/office/drawing/2014/main" id="{152EED49-F37E-453A-9CB2-5DB8C63E8280}"/>
+              </a:ext>
+            </a:extLst>
+          </p:cNvPr>
+          <p:cNvSpPr txBox="1"/>
+          <p:nvPr/>
+        </p:nvSpPr>
+        <p:spPr>
+          <a:xfrm>
+            <a:off x="702260" y="1143000"/>
+            <a:ext cx="10787480" cy="1323439"/>
+          </a:xfrm>
+          <a:prstGeom prst="rect">
+            <a:avLst/>
+          </a:prstGeom>
+          <a:noFill/>
+        </p:spPr>
+        <p:txBody>
+          <a:bodyPr wrap="square" rtlCol="0">
+            <a:spAutoFit/>
+          </a:bodyPr>
+          <a:lstStyle/>
+          <a:p>
+            <a:endParaRPr lang="en-US" sz="2000" dirty="0">
+              <a:latin typeface="+mn-lt"/>
+              <a:hlinkClick r:id="rId2"/>
+            </a:endParaRPr>
+          </a:p>
+          <a:p>
+            <a:endParaRPr lang="en-US" sz="2000" dirty="0">
+              <a:latin typeface="+mn-lt"/>
+              <a:hlinkClick r:id="rId2"/>
+            </a:endParaRPr>
+          </a:p>
+          <a:p>
+            <a:endParaRPr lang="en-US" sz="2000" dirty="0">
+              <a:latin typeface="+mn-lt"/>
+              <a:hlinkClick r:id="rId2"/>
+            </a:endParaRPr>
+          </a:p>
+          <a:p>
+            <a:endParaRPr lang="en-US" sz="2000" dirty="0">
+              <a:latin typeface="+mn-lt"/>
+            </a:endParaRPr>
+          </a:p>
+        </p:txBody>
+      </p:sp>
+      <p:sp>
+        <p:nvSpPr>
+          <p:cNvPr id="4" name="TextBox 3">
+            <a:extLst>
+              <a:ext uri="{FF2B5EF4-FFF2-40B4-BE49-F238E27FC236}">
+                <a16:creationId xmlns:a16="http://schemas.microsoft.com/office/drawing/2014/main" id="{39631D5A-6305-4840-BFDB-56E44EED0462}"/>
+              </a:ext>
+            </a:extLst>
+          </p:cNvPr>
+          <p:cNvSpPr txBox="1"/>
+          <p:nvPr/>
+        </p:nvSpPr>
+        <p:spPr>
+          <a:xfrm>
+            <a:off x="5701538" y="2105561"/>
+            <a:ext cx="4678980" cy="2554545"/>
+          </a:xfrm>
+          <a:prstGeom prst="rect">
+            <a:avLst/>
+          </a:prstGeom>
+          <a:noFill/>
+        </p:spPr>
+        <p:txBody>
+          <a:bodyPr wrap="square" rtlCol="0">
+            <a:spAutoFit/>
+          </a:bodyPr>
+          <a:lstStyle/>
+          <a:p>
+            <a:pPr marL="285750" indent="-285750">
+              <a:buFont typeface="Arial" panose="020B0604020202020204" pitchFamily="34" charset="0"/>
+              <a:buChar char="•"/>
+            </a:pPr>
+            <a:r>
+              <a:rPr lang="en-US" sz="2000" dirty="0">
+                <a:latin typeface="+mn-lt"/>
+              </a:rPr>
+              <a:t>Technical writing courses by Google</a:t>
+            </a:r>
+          </a:p>
+          <a:p>
+            <a:pPr marL="285750" indent="-285750">
+              <a:buFont typeface="Arial" panose="020B0604020202020204" pitchFamily="34" charset="0"/>
+              <a:buChar char="•"/>
+            </a:pPr>
+            <a:endParaRPr lang="en-US" sz="2000" dirty="0">
+              <a:latin typeface="+mn-lt"/>
+            </a:endParaRPr>
+          </a:p>
+          <a:p>
+            <a:pPr marL="285750" indent="-285750">
+              <a:buFont typeface="Arial" panose="020B0604020202020204" pitchFamily="34" charset="0"/>
+              <a:buChar char="•"/>
+            </a:pPr>
+            <a:r>
+              <a:rPr lang="en-US" sz="2000" dirty="0">
+                <a:latin typeface="+mn-lt"/>
+              </a:rPr>
+              <a:t>Two parts 3 hours total</a:t>
+            </a:r>
+          </a:p>
+          <a:p>
+            <a:pPr marL="285750" indent="-285750">
+              <a:buFont typeface="Arial" panose="020B0604020202020204" pitchFamily="34" charset="0"/>
+              <a:buChar char="•"/>
+            </a:pPr>
+            <a:endParaRPr lang="en-US" sz="2000" dirty="0">
+              <a:latin typeface="+mn-lt"/>
+            </a:endParaRPr>
+          </a:p>
+          <a:p>
+            <a:pPr marL="285750" indent="-285750">
+              <a:buFont typeface="Arial" panose="020B0604020202020204" pitchFamily="34" charset="0"/>
+              <a:buChar char="•"/>
+            </a:pPr>
+            <a:r>
+              <a:rPr lang="en-US" sz="2000" dirty="0">
+                <a:latin typeface="+mn-lt"/>
+              </a:rPr>
+              <a:t>Pre-class and in-class with a facilitator and students</a:t>
+            </a:r>
+          </a:p>
+          <a:p>
+            <a:pPr marL="285750" indent="-285750">
+              <a:buFont typeface="Arial" panose="020B0604020202020204" pitchFamily="34" charset="0"/>
+              <a:buChar char="•"/>
+            </a:pPr>
+            <a:endParaRPr lang="en-US" sz="2000" dirty="0">
+              <a:latin typeface="+mn-lt"/>
+            </a:endParaRPr>
+          </a:p>
+        </p:txBody>
+      </p:sp>
+    </p:spTree>
+    <p:extLst>
+      <p:ext uri="{BB962C8B-B14F-4D97-AF65-F5344CB8AC3E}">
+        <p14:creationId xmlns:p14="http://schemas.microsoft.com/office/powerpoint/2010/main" val="3394368255"/>
+      </p:ext>
+    </p:extLst>
+  </p:cSld>
+  <p:clrMapOvr>
+    <a:masterClrMapping/>
+  </p:clrMapOvr>
+</p:sld>
+</file>
+
+<file path=ppt/slides/slide5.xml><?xml version="1.0" encoding="utf-8"?>
+<p:sld xmlns:a="http://schemas.openxmlformats.org/drawingml/2006/main" xmlns:r="http://schemas.openxmlformats.org/officeDocument/2006/relationships" xmlns:p="http://schemas.openxmlformats.org/presentationml/2006/main">
+  <p:cSld>
+    <p:spTree>
+      <p:nvGrpSpPr>
+        <p:cNvPr id="1" name=""/>
+        <p:cNvGrpSpPr/>
+        <p:nvPr/>
+      </p:nvGrpSpPr>
+      <p:grpSpPr>
+        <a:xfrm>
+          <a:off x="0" y="0"/>
+          <a:ext cx="0" cy="0"/>
+          <a:chOff x="0" y="0"/>
+          <a:chExt cx="0" cy="0"/>
+        </a:xfrm>
+      </p:grpSpPr>
+      <p:sp>
+        <p:nvSpPr>
+          <p:cNvPr id="2" name="Title 1">
+            <a:extLst>
+              <a:ext uri="{FF2B5EF4-FFF2-40B4-BE49-F238E27FC236}">
+                <a16:creationId xmlns:a16="http://schemas.microsoft.com/office/drawing/2014/main" id="{E355E0FD-58C5-49E7-AB2A-46560FD288CA}"/>
+              </a:ext>
+            </a:extLst>
+          </p:cNvPr>
+          <p:cNvSpPr>
+            <a:spLocks noGrp="1"/>
+          </p:cNvSpPr>
+          <p:nvPr>
+            <p:ph type="title"/>
+          </p:nvPr>
+        </p:nvSpPr>
+        <p:spPr>
+          <a:xfrm>
+            <a:off x="609600" y="290224"/>
+            <a:ext cx="10972800" cy="722890"/>
+          </a:xfrm>
+        </p:spPr>
+        <p:txBody>
+          <a:bodyPr/>
+          <a:lstStyle/>
+          <a:p>
+            <a:pPr algn="ctr"/>
+            <a:r>
+              <a:rPr lang="en-US" dirty="0">
+                <a:solidFill>
+                  <a:schemeClr val="tx1"/>
+                </a:solidFill>
+                <a:latin typeface="+mj-lt"/>
+              </a:rPr>
+              <a:t>Requirements</a:t>
+            </a:r>
+            <a:endParaRPr lang="en-US" dirty="0"/>
+          </a:p>
+        </p:txBody>
+      </p:sp>
+      <p:sp>
+        <p:nvSpPr>
+          <p:cNvPr id="3" name="Text Placeholder 2">
+            <a:extLst>
+              <a:ext uri="{FF2B5EF4-FFF2-40B4-BE49-F238E27FC236}">
+                <a16:creationId xmlns:a16="http://schemas.microsoft.com/office/drawing/2014/main" id="{43AFD2A3-EAC6-41C7-ADB2-686CA9A4F95C}"/>
+              </a:ext>
+            </a:extLst>
+          </p:cNvPr>
+          <p:cNvSpPr>
+            <a:spLocks noGrp="1"/>
+          </p:cNvSpPr>
+          <p:nvPr>
+            <p:ph type="body" idx="1"/>
+          </p:nvPr>
+        </p:nvSpPr>
+        <p:spPr>
+          <a:xfrm>
+            <a:off x="609600" y="1600201"/>
+            <a:ext cx="10972800" cy="4967575"/>
+          </a:xfrm>
+        </p:spPr>
+        <p:txBody>
+          <a:bodyPr/>
+          <a:lstStyle/>
+          <a:p>
+            <a:r>
+              <a:rPr lang="en-US" dirty="0">
+                <a:latin typeface="+mn-lt"/>
+              </a:rPr>
+              <a:t>Professional software engineers</a:t>
+            </a:r>
+          </a:p>
+          <a:p>
+            <a:r>
+              <a:rPr lang="en-US" dirty="0">
+                <a:latin typeface="+mn-lt"/>
+              </a:rPr>
+              <a:t>Computer science students</a:t>
+            </a:r>
+          </a:p>
+          <a:p>
+            <a:r>
+              <a:rPr lang="en-US" dirty="0">
+                <a:latin typeface="+mn-lt"/>
+              </a:rPr>
+              <a:t>Engineering-adjacent roles, such as product managers</a:t>
+            </a:r>
+          </a:p>
+          <a:p>
+            <a:r>
+              <a:rPr lang="en-US" dirty="0">
+                <a:latin typeface="+mn-lt"/>
+              </a:rPr>
+              <a:t>B1+ writing</a:t>
+            </a:r>
+          </a:p>
+          <a:p>
+            <a:r>
+              <a:rPr lang="en-US" dirty="0">
+                <a:latin typeface="+mn-lt"/>
+              </a:rPr>
+              <a:t>Background in coding</a:t>
+            </a:r>
+          </a:p>
+        </p:txBody>
+      </p:sp>
+    </p:spTree>
+    <p:extLst>
+      <p:ext uri="{BB962C8B-B14F-4D97-AF65-F5344CB8AC3E}">
+        <p14:creationId xmlns:p14="http://schemas.microsoft.com/office/powerpoint/2010/main" val="885685478"/>
+      </p:ext>
+    </p:extLst>
+  </p:cSld>
+  <p:clrMapOvr>
+    <a:masterClrMapping/>
+  </p:clrMapOvr>
+</p:sld>
+</file>
+
+<file path=ppt/slides/slide6.xml><?xml version="1.0" encoding="utf-8"?>
+<p:sld xmlns:a="http://schemas.openxmlformats.org/drawingml/2006/main" xmlns:r="http://schemas.openxmlformats.org/officeDocument/2006/relationships" xmlns:p="http://schemas.openxmlformats.org/presentationml/2006/main">
+  <p:cSld>
+    <p:spTree>
+      <p:nvGrpSpPr>
+        <p:cNvPr id="1" name=""/>
+        <p:cNvGrpSpPr/>
+        <p:nvPr/>
+      </p:nvGrpSpPr>
+      <p:grpSpPr>
+        <a:xfrm>
+          <a:off x="0" y="0"/>
+          <a:ext cx="0" cy="0"/>
+          <a:chOff x="0" y="0"/>
+          <a:chExt cx="0" cy="0"/>
+        </a:xfrm>
+      </p:grpSpPr>
+      <p:sp>
+        <p:nvSpPr>
+          <p:cNvPr id="2" name="Title 1">
+            <a:extLst>
+              <a:ext uri="{FF2B5EF4-FFF2-40B4-BE49-F238E27FC236}">
+                <a16:creationId xmlns:a16="http://schemas.microsoft.com/office/drawing/2014/main" id="{E355E0FD-58C5-49E7-AB2A-46560FD288CA}"/>
+              </a:ext>
+            </a:extLst>
+          </p:cNvPr>
+          <p:cNvSpPr>
+            <a:spLocks noGrp="1"/>
+          </p:cNvSpPr>
+          <p:nvPr>
+            <p:ph type="title"/>
+          </p:nvPr>
+        </p:nvSpPr>
+        <p:spPr>
+          <a:xfrm>
+            <a:off x="609600" y="290224"/>
+            <a:ext cx="10972800" cy="722890"/>
+          </a:xfrm>
+        </p:spPr>
+        <p:txBody>
+          <a:bodyPr/>
+          <a:lstStyle/>
+          <a:p>
+            <a:pPr algn="ctr"/>
+            <a:r>
+              <a:rPr lang="en-US" dirty="0">
+                <a:solidFill>
+                  <a:schemeClr val="tx1"/>
+                </a:solidFill>
+                <a:latin typeface="+mj-lt"/>
+              </a:rPr>
+              <a:t>Requirements</a:t>
+            </a:r>
+            <a:endParaRPr lang="en-US" dirty="0"/>
+          </a:p>
+        </p:txBody>
+      </p:sp>
+      <p:sp>
+        <p:nvSpPr>
+          <p:cNvPr id="3" name="Text Placeholder 2">
+            <a:extLst>
+              <a:ext uri="{FF2B5EF4-FFF2-40B4-BE49-F238E27FC236}">
+                <a16:creationId xmlns:a16="http://schemas.microsoft.com/office/drawing/2014/main" id="{43AFD2A3-EAC6-41C7-ADB2-686CA9A4F95C}"/>
+              </a:ext>
+            </a:extLst>
+          </p:cNvPr>
+          <p:cNvSpPr>
+            <a:spLocks noGrp="1"/>
+          </p:cNvSpPr>
+          <p:nvPr>
+            <p:ph type="body" idx="1"/>
+          </p:nvPr>
+        </p:nvSpPr>
+        <p:spPr>
+          <a:xfrm>
+            <a:off x="609600" y="1600201"/>
+            <a:ext cx="10972800" cy="4967575"/>
+          </a:xfrm>
+        </p:spPr>
+        <p:txBody>
+          <a:bodyPr/>
+          <a:lstStyle/>
+          <a:p>
+            <a:r>
+              <a:rPr lang="en-US" dirty="0">
+                <a:latin typeface="+mn-lt"/>
+              </a:rPr>
+              <a:t>Professional software engineers</a:t>
+            </a:r>
+          </a:p>
+          <a:p>
+            <a:r>
+              <a:rPr lang="en-US" dirty="0">
+                <a:latin typeface="+mn-lt"/>
+              </a:rPr>
+              <a:t>Computer science students</a:t>
+            </a:r>
+          </a:p>
+          <a:p>
+            <a:r>
+              <a:rPr lang="en-US" dirty="0">
+                <a:latin typeface="+mn-lt"/>
+              </a:rPr>
+              <a:t>Engineering-adjacent roles, such as product managers</a:t>
+            </a:r>
+          </a:p>
+          <a:p>
+            <a:r>
+              <a:rPr lang="en-US" dirty="0">
+                <a:latin typeface="+mn-lt"/>
+              </a:rPr>
+              <a:t>B1+ writing</a:t>
+            </a:r>
+          </a:p>
+          <a:p>
+            <a:r>
+              <a:rPr lang="en-US" dirty="0">
+                <a:latin typeface="+mn-lt"/>
+              </a:rPr>
+              <a:t>Background in coding</a:t>
+            </a:r>
+          </a:p>
+        </p:txBody>
+      </p:sp>
+    </p:spTree>
+    <p:extLst>
+      <p:ext uri="{BB962C8B-B14F-4D97-AF65-F5344CB8AC3E}">
+        <p14:creationId xmlns:p14="http://schemas.microsoft.com/office/powerpoint/2010/main" val="3366623376"/>
+      </p:ext>
+    </p:extLst>
+  </p:cSld>
+  <p:clrMapOvr>
+    <a:masterClrMapping/>
+  </p:clrMapOvr>
+</p:sld>
+</file>
+
+<file path=ppt/slides/slide7.xml><?xml version="1.0" encoding="utf-8"?>
+<p:sld xmlns:a="http://schemas.openxmlformats.org/drawingml/2006/main" xmlns:r="http://schemas.openxmlformats.org/officeDocument/2006/relationships" xmlns:p="http://schemas.openxmlformats.org/presentationml/2006/main">
+  <p:cSld>
+    <p:spTree>
+      <p:nvGrpSpPr>
+        <p:cNvPr id="1" name=""/>
+        <p:cNvGrpSpPr/>
+        <p:nvPr/>
+      </p:nvGrpSpPr>
+      <p:grpSpPr>
+        <a:xfrm>
+          <a:off x="0" y="0"/>
+          <a:ext cx="0" cy="0"/>
+          <a:chOff x="0" y="0"/>
+          <a:chExt cx="0" cy="0"/>
+        </a:xfrm>
+      </p:grpSpPr>
+      <p:sp>
+        <p:nvSpPr>
+          <p:cNvPr id="2" name="Title 1">
+            <a:extLst>
+              <a:ext uri="{FF2B5EF4-FFF2-40B4-BE49-F238E27FC236}">
+                <a16:creationId xmlns:a16="http://schemas.microsoft.com/office/drawing/2014/main" id="{D398BFED-2F7F-49BD-B480-56FC297B15A8}"/>
+              </a:ext>
+            </a:extLst>
+          </p:cNvPr>
+          <p:cNvSpPr>
+            <a:spLocks noGrp="1"/>
+          </p:cNvSpPr>
+          <p:nvPr>
+            <p:ph type="title"/>
+          </p:nvPr>
+        </p:nvSpPr>
+        <p:spPr>
+          <a:xfrm>
             <a:off x="609600" y="2857500"/>
             <a:ext cx="10972800" cy="1143000"/>
           </a:xfrm>
@@ -4042,36 +4643,6 @@
           </a:p>
         </p:txBody>
       </p:sp>
-      <p:pic>
-        <p:nvPicPr>
-          <p:cNvPr id="4" name="Picture 3">
-            <a:extLst>
-              <a:ext uri="{FF2B5EF4-FFF2-40B4-BE49-F238E27FC236}">
-                <a16:creationId xmlns:a16="http://schemas.microsoft.com/office/drawing/2014/main" id="{EAD9C481-E811-41AA-A936-6EECA420880B}"/>
-              </a:ext>
-            </a:extLst>
-          </p:cNvPr>
-          <p:cNvPicPr>
-            <a:picLocks noChangeAspect="1"/>
-          </p:cNvPicPr>
-          <p:nvPr/>
-        </p:nvPicPr>
-        <p:blipFill>
-          <a:blip r:embed="rId2"/>
-          <a:stretch>
-            <a:fillRect/>
-          </a:stretch>
-        </p:blipFill>
-        <p:spPr>
-          <a:xfrm>
-            <a:off x="0" y="6270273"/>
-            <a:ext cx="1129537" cy="587727"/>
-          </a:xfrm>
-          <a:prstGeom prst="rect">
-            <a:avLst/>
-          </a:prstGeom>
-        </p:spPr>
-      </p:pic>
     </p:spTree>
     <p:extLst>
       <p:ext uri="{BB962C8B-B14F-4D97-AF65-F5344CB8AC3E}">
@@ -4085,7 +4656,7 @@
 </p:sld>
 </file>
 
-<file path=ppt/slides/slide5.xml><?xml version="1.0" encoding="utf-8"?>
+<file path=ppt/slides/slide8.xml><?xml version="1.0" encoding="utf-8"?>
 <p:sld xmlns:a="http://schemas.openxmlformats.org/drawingml/2006/main" xmlns:r="http://schemas.openxmlformats.org/officeDocument/2006/relationships" xmlns:p="http://schemas.openxmlformats.org/presentationml/2006/main">
   <p:cSld>
     <p:spTree>
@@ -4141,36 +4712,6 @@
           </a:p>
         </p:txBody>
       </p:sp>
-      <p:pic>
-        <p:nvPicPr>
-          <p:cNvPr id="4" name="Picture 3">
-            <a:extLst>
-              <a:ext uri="{FF2B5EF4-FFF2-40B4-BE49-F238E27FC236}">
-                <a16:creationId xmlns:a16="http://schemas.microsoft.com/office/drawing/2014/main" id="{EAD9C481-E811-41AA-A936-6EECA420880B}"/>
-              </a:ext>
-            </a:extLst>
-          </p:cNvPr>
-          <p:cNvPicPr>
-            <a:picLocks noChangeAspect="1"/>
-          </p:cNvPicPr>
-          <p:nvPr/>
-        </p:nvPicPr>
-        <p:blipFill>
-          <a:blip r:embed="rId2"/>
-          <a:stretch>
-            <a:fillRect/>
-          </a:stretch>
-        </p:blipFill>
-        <p:spPr>
-          <a:xfrm>
-            <a:off x="0" y="6270273"/>
-            <a:ext cx="1129537" cy="587727"/>
-          </a:xfrm>
-          <a:prstGeom prst="rect">
-            <a:avLst/>
-          </a:prstGeom>
-        </p:spPr>
-      </p:pic>
       <p:sp>
         <p:nvSpPr>
           <p:cNvPr id="3" name="TextBox 2">
@@ -4201,19 +4742,19 @@
           <a:p>
             <a:endParaRPr lang="en-US" sz="2000" dirty="0">
               <a:latin typeface="+mn-lt"/>
-              <a:hlinkClick r:id="rId3"/>
+              <a:hlinkClick r:id="rId2"/>
             </a:endParaRPr>
           </a:p>
           <a:p>
             <a:endParaRPr lang="en-US" sz="2000" dirty="0">
               <a:latin typeface="+mn-lt"/>
-              <a:hlinkClick r:id="rId3"/>
+              <a:hlinkClick r:id="rId2"/>
             </a:endParaRPr>
           </a:p>
           <a:p>
             <a:endParaRPr lang="en-US" sz="2000" dirty="0">
               <a:latin typeface="+mn-lt"/>
-              <a:hlinkClick r:id="rId3"/>
+              <a:hlinkClick r:id="rId2"/>
             </a:endParaRPr>
           </a:p>
           <a:p>
@@ -4236,7 +4777,7 @@
 </p:sld>
 </file>
 
-<file path=ppt/slides/slide6.xml><?xml version="1.0" encoding="utf-8"?>
+<file path=ppt/slides/slide9.xml><?xml version="1.0" encoding="utf-8"?>
 <p:sld xmlns:a="http://schemas.openxmlformats.org/drawingml/2006/main" xmlns:r="http://schemas.openxmlformats.org/officeDocument/2006/relationships" xmlns:p="http://schemas.openxmlformats.org/presentationml/2006/main">
   <p:cSld>
     <p:spTree>
@@ -4292,36 +4833,6 @@
           </a:p>
         </p:txBody>
       </p:sp>
-      <p:pic>
-        <p:nvPicPr>
-          <p:cNvPr id="4" name="Picture 3">
-            <a:extLst>
-              <a:ext uri="{FF2B5EF4-FFF2-40B4-BE49-F238E27FC236}">
-                <a16:creationId xmlns:a16="http://schemas.microsoft.com/office/drawing/2014/main" id="{EAD9C481-E811-41AA-A936-6EECA420880B}"/>
-              </a:ext>
-            </a:extLst>
-          </p:cNvPr>
-          <p:cNvPicPr>
-            <a:picLocks noChangeAspect="1"/>
-          </p:cNvPicPr>
-          <p:nvPr/>
-        </p:nvPicPr>
-        <p:blipFill>
-          <a:blip r:embed="rId2"/>
-          <a:stretch>
-            <a:fillRect/>
-          </a:stretch>
-        </p:blipFill>
-        <p:spPr>
-          <a:xfrm>
-            <a:off x="0" y="6270273"/>
-            <a:ext cx="1129537" cy="587727"/>
-          </a:xfrm>
-          <a:prstGeom prst="rect">
-            <a:avLst/>
-          </a:prstGeom>
-        </p:spPr>
-      </p:pic>
     </p:spTree>
     <p:extLst>
       <p:ext uri="{BB962C8B-B14F-4D97-AF65-F5344CB8AC3E}">

</xml_diff>